<commit_message>
Update cost alignment further
</commit_message>
<xml_diff>
--- a/web_images.pptx
+++ b/web_images.pptx
@@ -1610,7 +1610,7 @@
           <a:p>
             <a:fld id="{1FB3F173-BE72-4216-9B47-DEC45743D4D9}" type="datetimeFigureOut">
               <a:rPr lang="en-GB" smtClean="0"/>
-              <a:t>15/03/2022</a:t>
+              <a:t>28/03/2022</a:t>
             </a:fld>
             <a:endParaRPr lang="en-GB"/>
           </a:p>
@@ -1810,7 +1810,7 @@
           <a:p>
             <a:fld id="{1FB3F173-BE72-4216-9B47-DEC45743D4D9}" type="datetimeFigureOut">
               <a:rPr lang="en-GB" smtClean="0"/>
-              <a:t>15/03/2022</a:t>
+              <a:t>28/03/2022</a:t>
             </a:fld>
             <a:endParaRPr lang="en-GB"/>
           </a:p>
@@ -2020,7 +2020,7 @@
           <a:p>
             <a:fld id="{1FB3F173-BE72-4216-9B47-DEC45743D4D9}" type="datetimeFigureOut">
               <a:rPr lang="en-GB" smtClean="0"/>
-              <a:t>15/03/2022</a:t>
+              <a:t>28/03/2022</a:t>
             </a:fld>
             <a:endParaRPr lang="en-GB"/>
           </a:p>
@@ -2220,7 +2220,7 @@
           <a:p>
             <a:fld id="{1FB3F173-BE72-4216-9B47-DEC45743D4D9}" type="datetimeFigureOut">
               <a:rPr lang="en-GB" smtClean="0"/>
-              <a:t>15/03/2022</a:t>
+              <a:t>28/03/2022</a:t>
             </a:fld>
             <a:endParaRPr lang="en-GB"/>
           </a:p>
@@ -2496,7 +2496,7 @@
           <a:p>
             <a:fld id="{1FB3F173-BE72-4216-9B47-DEC45743D4D9}" type="datetimeFigureOut">
               <a:rPr lang="en-GB" smtClean="0"/>
-              <a:t>15/03/2022</a:t>
+              <a:t>28/03/2022</a:t>
             </a:fld>
             <a:endParaRPr lang="en-GB"/>
           </a:p>
@@ -2764,7 +2764,7 @@
           <a:p>
             <a:fld id="{1FB3F173-BE72-4216-9B47-DEC45743D4D9}" type="datetimeFigureOut">
               <a:rPr lang="en-GB" smtClean="0"/>
-              <a:t>15/03/2022</a:t>
+              <a:t>28/03/2022</a:t>
             </a:fld>
             <a:endParaRPr lang="en-GB"/>
           </a:p>
@@ -3179,7 +3179,7 @@
           <a:p>
             <a:fld id="{1FB3F173-BE72-4216-9B47-DEC45743D4D9}" type="datetimeFigureOut">
               <a:rPr lang="en-GB" smtClean="0"/>
-              <a:t>15/03/2022</a:t>
+              <a:t>28/03/2022</a:t>
             </a:fld>
             <a:endParaRPr lang="en-GB"/>
           </a:p>
@@ -3321,7 +3321,7 @@
           <a:p>
             <a:fld id="{1FB3F173-BE72-4216-9B47-DEC45743D4D9}" type="datetimeFigureOut">
               <a:rPr lang="en-GB" smtClean="0"/>
-              <a:t>15/03/2022</a:t>
+              <a:t>28/03/2022</a:t>
             </a:fld>
             <a:endParaRPr lang="en-GB"/>
           </a:p>
@@ -3434,7 +3434,7 @@
           <a:p>
             <a:fld id="{1FB3F173-BE72-4216-9B47-DEC45743D4D9}" type="datetimeFigureOut">
               <a:rPr lang="en-GB" smtClean="0"/>
-              <a:t>15/03/2022</a:t>
+              <a:t>28/03/2022</a:t>
             </a:fld>
             <a:endParaRPr lang="en-GB"/>
           </a:p>
@@ -3747,7 +3747,7 @@
           <a:p>
             <a:fld id="{1FB3F173-BE72-4216-9B47-DEC45743D4D9}" type="datetimeFigureOut">
               <a:rPr lang="en-GB" smtClean="0"/>
-              <a:t>15/03/2022</a:t>
+              <a:t>28/03/2022</a:t>
             </a:fld>
             <a:endParaRPr lang="en-GB"/>
           </a:p>
@@ -4036,7 +4036,7 @@
           <a:p>
             <a:fld id="{1FB3F173-BE72-4216-9B47-DEC45743D4D9}" type="datetimeFigureOut">
               <a:rPr lang="en-GB" smtClean="0"/>
-              <a:t>15/03/2022</a:t>
+              <a:t>28/03/2022</a:t>
             </a:fld>
             <a:endParaRPr lang="en-GB"/>
           </a:p>
@@ -4279,7 +4279,7 @@
           <a:p>
             <a:fld id="{1FB3F173-BE72-4216-9B47-DEC45743D4D9}" type="datetimeFigureOut">
               <a:rPr lang="en-GB" smtClean="0"/>
-              <a:t>15/03/2022</a:t>
+              <a:t>28/03/2022</a:t>
             </a:fld>
             <a:endParaRPr lang="en-GB"/>
           </a:p>
@@ -7374,10 +7374,10 @@
       </p:grpSp>
       <p:grpSp>
         <p:nvGrpSpPr>
-          <p:cNvPr id="6" name="Group 5">
+          <p:cNvPr id="98" name="Group 97">
             <a:extLst>
               <a:ext uri="{FF2B5EF4-FFF2-40B4-BE49-F238E27FC236}">
-                <a16:creationId xmlns:a16="http://schemas.microsoft.com/office/drawing/2014/main" id="{F3D57AA1-2361-4001-AFAF-8D1DAE997763}"/>
+                <a16:creationId xmlns:a16="http://schemas.microsoft.com/office/drawing/2014/main" id="{CC01733A-A4D7-4F52-BC0F-7332B6D6FC1D}"/>
               </a:ext>
             </a:extLst>
           </p:cNvPr>
@@ -7388,16 +7388,75 @@
           <a:xfrm>
             <a:off x="7580546" y="354153"/>
             <a:ext cx="4083919" cy="2941232"/>
-            <a:chOff x="7580546" y="354153"/>
+            <a:chOff x="7903812" y="131608"/>
             <a:chExt cx="4083919" cy="2941232"/>
           </a:xfrm>
         </p:grpSpPr>
+        <p:sp>
+          <p:nvSpPr>
+            <p:cNvPr id="99" name="Rectangle: Rounded Corners 98">
+              <a:extLst>
+                <a:ext uri="{FF2B5EF4-FFF2-40B4-BE49-F238E27FC236}">
+                  <a16:creationId xmlns:a16="http://schemas.microsoft.com/office/drawing/2014/main" id="{7C4359CF-246A-43EE-8302-9338F8A2692A}"/>
+                </a:ext>
+              </a:extLst>
+            </p:cNvPr>
+            <p:cNvSpPr/>
+            <p:nvPr/>
+          </p:nvSpPr>
+          <p:spPr>
+            <a:xfrm>
+              <a:off x="7903812" y="131608"/>
+              <a:ext cx="4083919" cy="2941232"/>
+            </a:xfrm>
+            <a:prstGeom prst="roundRect">
+              <a:avLst/>
+            </a:prstGeom>
+            <a:noFill/>
+            <a:ln w="76200">
+              <a:solidFill>
+                <a:schemeClr val="accent1">
+                  <a:lumMod val="60000"/>
+                  <a:lumOff val="40000"/>
+                </a:schemeClr>
+              </a:solidFill>
+            </a:ln>
+          </p:spPr>
+          <p:style>
+            <a:lnRef idx="2">
+              <a:schemeClr val="accent5"/>
+            </a:lnRef>
+            <a:fillRef idx="1">
+              <a:schemeClr val="lt1"/>
+            </a:fillRef>
+            <a:effectRef idx="0">
+              <a:schemeClr val="accent5"/>
+            </a:effectRef>
+            <a:fontRef idx="minor">
+              <a:schemeClr val="dk1"/>
+            </a:fontRef>
+          </p:style>
+          <p:txBody>
+            <a:bodyPr rtlCol="0" anchor="b"/>
+            <a:lstStyle/>
+            <a:p>
+              <a:pPr algn="ctr"/>
+              <a:r>
+                <a:rPr lang="en-GB" sz="3600" dirty="0">
+                  <a:ea typeface="Tahoma" panose="020B0604030504040204" pitchFamily="34" charset="0"/>
+                  <a:cs typeface="Tahoma" panose="020B0604030504040204" pitchFamily="34" charset="0"/>
+                </a:rPr>
+                <a:t>Terraced</a:t>
+              </a:r>
+            </a:p>
+          </p:txBody>
+        </p:sp>
         <p:grpSp>
           <p:nvGrpSpPr>
-            <p:cNvPr id="98" name="Group 97">
+            <p:cNvPr id="100" name="Group 99">
               <a:extLst>
                 <a:ext uri="{FF2B5EF4-FFF2-40B4-BE49-F238E27FC236}">
-                  <a16:creationId xmlns:a16="http://schemas.microsoft.com/office/drawing/2014/main" id="{CC01733A-A4D7-4F52-BC0F-7332B6D6FC1D}"/>
+                  <a16:creationId xmlns:a16="http://schemas.microsoft.com/office/drawing/2014/main" id="{7CAA89A4-B40B-4FA6-ABE0-142FFED000D3}"/>
                 </a:ext>
               </a:extLst>
             </p:cNvPr>
@@ -7406,77 +7465,18 @@
           </p:nvGrpSpPr>
           <p:grpSpPr>
             <a:xfrm>
-              <a:off x="7580546" y="354153"/>
-              <a:ext cx="4083919" cy="2941232"/>
-              <a:chOff x="7903812" y="131608"/>
-              <a:chExt cx="4083919" cy="2941232"/>
+              <a:off x="8035165" y="493183"/>
+              <a:ext cx="3815788" cy="1909141"/>
+              <a:chOff x="3223422" y="2484436"/>
+              <a:chExt cx="3815788" cy="1909141"/>
             </a:xfrm>
           </p:grpSpPr>
-          <p:sp>
-            <p:nvSpPr>
-              <p:cNvPr id="99" name="Rectangle: Rounded Corners 98">
+          <p:grpSp>
+            <p:nvGrpSpPr>
+              <p:cNvPr id="101" name="Group 100">
                 <a:extLst>
                   <a:ext uri="{FF2B5EF4-FFF2-40B4-BE49-F238E27FC236}">
-                    <a16:creationId xmlns:a16="http://schemas.microsoft.com/office/drawing/2014/main" id="{7C4359CF-246A-43EE-8302-9338F8A2692A}"/>
-                  </a:ext>
-                </a:extLst>
-              </p:cNvPr>
-              <p:cNvSpPr/>
-              <p:nvPr/>
-            </p:nvSpPr>
-            <p:spPr>
-              <a:xfrm>
-                <a:off x="7903812" y="131608"/>
-                <a:ext cx="4083919" cy="2941232"/>
-              </a:xfrm>
-              <a:prstGeom prst="roundRect">
-                <a:avLst/>
-              </a:prstGeom>
-              <a:noFill/>
-              <a:ln w="76200">
-                <a:solidFill>
-                  <a:schemeClr val="accent1">
-                    <a:lumMod val="60000"/>
-                    <a:lumOff val="40000"/>
-                  </a:schemeClr>
-                </a:solidFill>
-              </a:ln>
-            </p:spPr>
-            <p:style>
-              <a:lnRef idx="2">
-                <a:schemeClr val="accent5"/>
-              </a:lnRef>
-              <a:fillRef idx="1">
-                <a:schemeClr val="lt1"/>
-              </a:fillRef>
-              <a:effectRef idx="0">
-                <a:schemeClr val="accent5"/>
-              </a:effectRef>
-              <a:fontRef idx="minor">
-                <a:schemeClr val="dk1"/>
-              </a:fontRef>
-            </p:style>
-            <p:txBody>
-              <a:bodyPr rtlCol="0" anchor="b"/>
-              <a:lstStyle/>
-              <a:p>
-                <a:pPr algn="ctr"/>
-                <a:r>
-                  <a:rPr lang="en-GB" sz="3600" dirty="0">
-                    <a:ea typeface="Tahoma" panose="020B0604030504040204" pitchFamily="34" charset="0"/>
-                    <a:cs typeface="Tahoma" panose="020B0604030504040204" pitchFamily="34" charset="0"/>
-                  </a:rPr>
-                  <a:t>Terraced</a:t>
-                </a:r>
-              </a:p>
-            </p:txBody>
-          </p:sp>
-          <p:grpSp>
-            <p:nvGrpSpPr>
-              <p:cNvPr id="100" name="Group 99">
-                <a:extLst>
-                  <a:ext uri="{FF2B5EF4-FFF2-40B4-BE49-F238E27FC236}">
-                    <a16:creationId xmlns:a16="http://schemas.microsoft.com/office/drawing/2014/main" id="{7CAA89A4-B40B-4FA6-ABE0-142FFED000D3}"/>
+                    <a16:creationId xmlns:a16="http://schemas.microsoft.com/office/drawing/2014/main" id="{05D86440-0DDA-4179-957A-0A1527B0F1D8}"/>
                   </a:ext>
                 </a:extLst>
               </p:cNvPr>
@@ -7485,18 +7485,18 @@
             </p:nvGrpSpPr>
             <p:grpSpPr>
               <a:xfrm>
-                <a:off x="8035165" y="493183"/>
-                <a:ext cx="3815788" cy="1909141"/>
+                <a:off x="3223422" y="2484436"/>
+                <a:ext cx="1604252" cy="1909141"/>
                 <a:chOff x="3223422" y="2484436"/>
-                <a:chExt cx="3815788" cy="1909141"/>
+                <a:chExt cx="1604252" cy="1909141"/>
               </a:xfrm>
             </p:grpSpPr>
             <p:grpSp>
               <p:nvGrpSpPr>
-                <p:cNvPr id="101" name="Group 100">
+                <p:cNvPr id="112" name="Group 111">
                   <a:extLst>
                     <a:ext uri="{FF2B5EF4-FFF2-40B4-BE49-F238E27FC236}">
-                      <a16:creationId xmlns:a16="http://schemas.microsoft.com/office/drawing/2014/main" id="{05D86440-0DDA-4179-957A-0A1527B0F1D8}"/>
+                      <a16:creationId xmlns:a16="http://schemas.microsoft.com/office/drawing/2014/main" id="{17D6B5A8-DB69-4232-9B15-908A60D79B28}"/>
                     </a:ext>
                   </a:extLst>
                 </p:cNvPr>
@@ -7506,166 +7506,166 @@
               <p:grpSpPr>
                 <a:xfrm>
                   <a:off x="3223422" y="2484436"/>
-                  <a:ext cx="1604252" cy="1909141"/>
-                  <a:chOff x="3223422" y="2484436"/>
-                  <a:chExt cx="1604252" cy="1909141"/>
+                  <a:ext cx="1437699" cy="880118"/>
+                  <a:chOff x="3286922" y="2464264"/>
+                  <a:chExt cx="1437699" cy="880118"/>
                 </a:xfrm>
               </p:grpSpPr>
-              <p:grpSp>
-                <p:nvGrpSpPr>
-                  <p:cNvPr id="112" name="Group 111">
+              <p:cxnSp>
+                <p:nvCxnSpPr>
+                  <p:cNvPr id="114" name="Straight Connector 113">
                     <a:extLst>
                       <a:ext uri="{FF2B5EF4-FFF2-40B4-BE49-F238E27FC236}">
-                        <a16:creationId xmlns:a16="http://schemas.microsoft.com/office/drawing/2014/main" id="{17D6B5A8-DB69-4232-9B15-908A60D79B28}"/>
+                        <a16:creationId xmlns:a16="http://schemas.microsoft.com/office/drawing/2014/main" id="{5C87A5A2-A357-4869-92B7-444A647276B1}"/>
                       </a:ext>
                     </a:extLst>
                   </p:cNvPr>
-                  <p:cNvGrpSpPr/>
+                  <p:cNvCxnSpPr>
+                    <a:cxnSpLocks/>
+                  </p:cNvCxnSpPr>
                   <p:nvPr/>
-                </p:nvGrpSpPr>
-                <p:grpSpPr>
-                  <a:xfrm>
-                    <a:off x="3223422" y="2484436"/>
-                    <a:ext cx="1437699" cy="880118"/>
-                    <a:chOff x="3286922" y="2464264"/>
-                    <a:chExt cx="1437699" cy="880118"/>
+                </p:nvCxnSpPr>
+                <p:spPr>
+                  <a:xfrm flipH="1">
+                    <a:off x="3286922" y="2464264"/>
+                    <a:ext cx="925785" cy="880118"/>
                   </a:xfrm>
-                </p:grpSpPr>
-                <p:cxnSp>
-                  <p:nvCxnSpPr>
-                    <p:cNvPr id="114" name="Straight Connector 113">
-                      <a:extLst>
-                        <a:ext uri="{FF2B5EF4-FFF2-40B4-BE49-F238E27FC236}">
-                          <a16:creationId xmlns:a16="http://schemas.microsoft.com/office/drawing/2014/main" id="{5C87A5A2-A357-4869-92B7-444A647276B1}"/>
-                        </a:ext>
-                      </a:extLst>
-                    </p:cNvPr>
-                    <p:cNvCxnSpPr>
-                      <a:cxnSpLocks/>
-                    </p:cNvCxnSpPr>
-                    <p:nvPr/>
-                  </p:nvCxnSpPr>
-                  <p:spPr>
-                    <a:xfrm flipH="1">
-                      <a:off x="3286922" y="2464264"/>
-                      <a:ext cx="925785" cy="880118"/>
-                    </a:xfrm>
-                    <a:prstGeom prst="line">
-                      <a:avLst/>
-                    </a:prstGeom>
-                    <a:ln w="152400">
-                      <a:solidFill>
-                        <a:schemeClr val="tx1"/>
-                      </a:solidFill>
-                    </a:ln>
-                  </p:spPr>
-                  <p:style>
-                    <a:lnRef idx="1">
-                      <a:schemeClr val="accent1"/>
-                    </a:lnRef>
-                    <a:fillRef idx="0">
-                      <a:schemeClr val="accent1"/>
-                    </a:fillRef>
-                    <a:effectRef idx="0">
-                      <a:schemeClr val="accent1"/>
-                    </a:effectRef>
-                    <a:fontRef idx="minor">
+                  <a:prstGeom prst="line">
+                    <a:avLst/>
+                  </a:prstGeom>
+                  <a:ln w="152400">
+                    <a:solidFill>
                       <a:schemeClr val="tx1"/>
-                    </a:fontRef>
-                  </p:style>
-                </p:cxnSp>
-                <p:cxnSp>
-                  <p:nvCxnSpPr>
-                    <p:cNvPr id="115" name="Straight Connector 114">
-                      <a:extLst>
-                        <a:ext uri="{FF2B5EF4-FFF2-40B4-BE49-F238E27FC236}">
-                          <a16:creationId xmlns:a16="http://schemas.microsoft.com/office/drawing/2014/main" id="{C98EEDB3-EC5B-445E-B75C-E095D1C0FB7A}"/>
-                        </a:ext>
-                      </a:extLst>
-                    </p:cNvPr>
-                    <p:cNvCxnSpPr>
-                      <a:cxnSpLocks/>
-                    </p:cNvCxnSpPr>
-                    <p:nvPr/>
-                  </p:nvCxnSpPr>
-                  <p:spPr>
-                    <a:xfrm>
-                      <a:off x="4099145" y="2464264"/>
-                      <a:ext cx="625476" cy="588964"/>
-                    </a:xfrm>
-                    <a:prstGeom prst="line">
-                      <a:avLst/>
-                    </a:prstGeom>
-                    <a:ln w="152400">
-                      <a:solidFill>
-                        <a:schemeClr val="tx1"/>
-                      </a:solidFill>
-                    </a:ln>
-                  </p:spPr>
-                  <p:style>
-                    <a:lnRef idx="1">
-                      <a:schemeClr val="accent1"/>
-                    </a:lnRef>
-                    <a:fillRef idx="0">
-                      <a:schemeClr val="accent1"/>
-                    </a:fillRef>
-                    <a:effectRef idx="0">
-                      <a:schemeClr val="accent1"/>
-                    </a:effectRef>
-                    <a:fontRef idx="minor">
-                      <a:schemeClr val="tx1"/>
-                    </a:fontRef>
-                  </p:style>
-                </p:cxnSp>
-              </p:grpSp>
-              <p:pic>
-                <p:nvPicPr>
-                  <p:cNvPr id="113" name="Graphic 112" descr="Home with solid fill">
+                    </a:solidFill>
+                  </a:ln>
+                </p:spPr>
+                <p:style>
+                  <a:lnRef idx="1">
+                    <a:schemeClr val="accent1"/>
+                  </a:lnRef>
+                  <a:fillRef idx="0">
+                    <a:schemeClr val="accent1"/>
+                  </a:fillRef>
+                  <a:effectRef idx="0">
+                    <a:schemeClr val="accent1"/>
+                  </a:effectRef>
+                  <a:fontRef idx="minor">
+                    <a:schemeClr val="tx1"/>
+                  </a:fontRef>
+                </p:style>
+              </p:cxnSp>
+              <p:cxnSp>
+                <p:nvCxnSpPr>
+                  <p:cNvPr id="115" name="Straight Connector 114">
                     <a:extLst>
                       <a:ext uri="{FF2B5EF4-FFF2-40B4-BE49-F238E27FC236}">
-                        <a16:creationId xmlns:a16="http://schemas.microsoft.com/office/drawing/2014/main" id="{5E72C222-F587-474B-AF20-A40970D6A52A}"/>
+                        <a16:creationId xmlns:a16="http://schemas.microsoft.com/office/drawing/2014/main" id="{C98EEDB3-EC5B-445E-B75C-E095D1C0FB7A}"/>
                       </a:ext>
                     </a:extLst>
                   </p:cNvPr>
-                  <p:cNvPicPr>
-                    <a:picLocks noChangeAspect="1"/>
-                  </p:cNvPicPr>
+                  <p:cNvCxnSpPr>
+                    <a:cxnSpLocks/>
+                  </p:cNvCxnSpPr>
                   <p:nvPr/>
-                </p:nvPicPr>
-                <p:blipFill rotWithShape="1">
-                  <a:blip r:embed="rId2">
-                    <a:extLst>
-                      <a:ext uri="{28A0092B-C50C-407E-A947-70E740481C1C}">
-                        <a14:useLocalDpi xmlns:a14="http://schemas.microsoft.com/office/drawing/2010/main" val="0"/>
-                      </a:ext>
-                      <a:ext uri="{96DAC541-7B7A-43D3-8B79-37D633B846F1}">
-                        <asvg:svgBlip xmlns:asvg="http://schemas.microsoft.com/office/drawing/2016/SVG/main" r:embed="rId3"/>
-                      </a:ext>
-                    </a:extLst>
-                  </a:blip>
-                  <a:srcRect l="16712" t="27585" r="16736" b="1"/>
-                  <a:stretch/>
-                </p:blipFill>
+                </p:nvCxnSpPr>
                 <p:spPr>
                   <a:xfrm>
-                    <a:off x="3357014" y="2793377"/>
-                    <a:ext cx="1470660" cy="1600200"/>
+                    <a:off x="4099145" y="2464264"/>
+                    <a:ext cx="625476" cy="588964"/>
                   </a:xfrm>
-                  <a:prstGeom prst="snip2SameRect">
-                    <a:avLst>
-                      <a:gd name="adj1" fmla="val 41278"/>
-                      <a:gd name="adj2" fmla="val 0"/>
-                    </a:avLst>
+                  <a:prstGeom prst="line">
+                    <a:avLst/>
                   </a:prstGeom>
+                  <a:ln w="152400">
+                    <a:solidFill>
+                      <a:schemeClr val="tx1"/>
+                    </a:solidFill>
+                  </a:ln>
                 </p:spPr>
-              </p:pic>
+                <p:style>
+                  <a:lnRef idx="1">
+                    <a:schemeClr val="accent1"/>
+                  </a:lnRef>
+                  <a:fillRef idx="0">
+                    <a:schemeClr val="accent1"/>
+                  </a:fillRef>
+                  <a:effectRef idx="0">
+                    <a:schemeClr val="accent1"/>
+                  </a:effectRef>
+                  <a:fontRef idx="minor">
+                    <a:schemeClr val="tx1"/>
+                  </a:fontRef>
+                </p:style>
+              </p:cxnSp>
             </p:grpSp>
+            <p:pic>
+              <p:nvPicPr>
+                <p:cNvPr id="113" name="Graphic 112" descr="Home with solid fill">
+                  <a:extLst>
+                    <a:ext uri="{FF2B5EF4-FFF2-40B4-BE49-F238E27FC236}">
+                      <a16:creationId xmlns:a16="http://schemas.microsoft.com/office/drawing/2014/main" id="{5E72C222-F587-474B-AF20-A40970D6A52A}"/>
+                    </a:ext>
+                  </a:extLst>
+                </p:cNvPr>
+                <p:cNvPicPr>
+                  <a:picLocks noChangeAspect="1"/>
+                </p:cNvPicPr>
+                <p:nvPr/>
+              </p:nvPicPr>
+              <p:blipFill rotWithShape="1">
+                <a:blip r:embed="rId2">
+                  <a:extLst>
+                    <a:ext uri="{28A0092B-C50C-407E-A947-70E740481C1C}">
+                      <a14:useLocalDpi xmlns:a14="http://schemas.microsoft.com/office/drawing/2010/main" val="0"/>
+                    </a:ext>
+                    <a:ext uri="{96DAC541-7B7A-43D3-8B79-37D633B846F1}">
+                      <asvg:svgBlip xmlns:asvg="http://schemas.microsoft.com/office/drawing/2016/SVG/main" r:embed="rId3"/>
+                    </a:ext>
+                  </a:extLst>
+                </a:blip>
+                <a:srcRect l="16712" t="27585" r="16736" b="1"/>
+                <a:stretch/>
+              </p:blipFill>
+              <p:spPr>
+                <a:xfrm>
+                  <a:off x="3357014" y="2793377"/>
+                  <a:ext cx="1470660" cy="1600200"/>
+                </a:xfrm>
+                <a:prstGeom prst="snip2SameRect">
+                  <a:avLst>
+                    <a:gd name="adj1" fmla="val 41278"/>
+                    <a:gd name="adj2" fmla="val 0"/>
+                  </a:avLst>
+                </a:prstGeom>
+              </p:spPr>
+            </p:pic>
+          </p:grpSp>
+          <p:grpSp>
+            <p:nvGrpSpPr>
+              <p:cNvPr id="102" name="Group 101">
+                <a:extLst>
+                  <a:ext uri="{FF2B5EF4-FFF2-40B4-BE49-F238E27FC236}">
+                    <a16:creationId xmlns:a16="http://schemas.microsoft.com/office/drawing/2014/main" id="{F0E601D5-976F-4CCF-A06A-07D8F8048E9A}"/>
+                  </a:ext>
+                </a:extLst>
+              </p:cNvPr>
+              <p:cNvGrpSpPr/>
+              <p:nvPr/>
+            </p:nvGrpSpPr>
+            <p:grpSpPr>
+              <a:xfrm>
+                <a:off x="4398699" y="2484436"/>
+                <a:ext cx="1470660" cy="1909141"/>
+                <a:chOff x="3357014" y="2484436"/>
+                <a:chExt cx="1470660" cy="1909141"/>
+              </a:xfrm>
+            </p:grpSpPr>
             <p:grpSp>
               <p:nvGrpSpPr>
-                <p:cNvPr id="102" name="Group 101">
+                <p:cNvPr id="108" name="Group 107">
                   <a:extLst>
                     <a:ext uri="{FF2B5EF4-FFF2-40B4-BE49-F238E27FC236}">
-                      <a16:creationId xmlns:a16="http://schemas.microsoft.com/office/drawing/2014/main" id="{F0E601D5-976F-4CCF-A06A-07D8F8048E9A}"/>
+                      <a16:creationId xmlns:a16="http://schemas.microsoft.com/office/drawing/2014/main" id="{CBE41EA7-67AD-482E-AD06-3A80025AF7F0}"/>
                     </a:ext>
                   </a:extLst>
                 </p:cNvPr>
@@ -7674,167 +7674,167 @@
               </p:nvGrpSpPr>
               <p:grpSpPr>
                 <a:xfrm>
-                  <a:off x="4398699" y="2484436"/>
-                  <a:ext cx="1470660" cy="1909141"/>
-                  <a:chOff x="3357014" y="2484436"/>
-                  <a:chExt cx="1470660" cy="1909141"/>
+                  <a:off x="3523731" y="2484436"/>
+                  <a:ext cx="1138314" cy="590400"/>
+                  <a:chOff x="3587231" y="2464264"/>
+                  <a:chExt cx="1138314" cy="590400"/>
                 </a:xfrm>
               </p:grpSpPr>
-              <p:grpSp>
-                <p:nvGrpSpPr>
-                  <p:cNvPr id="108" name="Group 107">
+              <p:cxnSp>
+                <p:nvCxnSpPr>
+                  <p:cNvPr id="110" name="Straight Connector 109">
                     <a:extLst>
                       <a:ext uri="{FF2B5EF4-FFF2-40B4-BE49-F238E27FC236}">
-                        <a16:creationId xmlns:a16="http://schemas.microsoft.com/office/drawing/2014/main" id="{CBE41EA7-67AD-482E-AD06-3A80025AF7F0}"/>
+                        <a16:creationId xmlns:a16="http://schemas.microsoft.com/office/drawing/2014/main" id="{1532717E-204C-46AF-B7F2-17ADBAD2F823}"/>
                       </a:ext>
                     </a:extLst>
                   </p:cNvPr>
-                  <p:cNvGrpSpPr/>
+                  <p:cNvCxnSpPr>
+                    <a:cxnSpLocks/>
+                  </p:cNvCxnSpPr>
                   <p:nvPr/>
-                </p:nvGrpSpPr>
-                <p:grpSpPr>
-                  <a:xfrm>
-                    <a:off x="3523731" y="2484436"/>
-                    <a:ext cx="1138314" cy="590400"/>
-                    <a:chOff x="3587231" y="2464264"/>
-                    <a:chExt cx="1138314" cy="590400"/>
+                </p:nvCxnSpPr>
+                <p:spPr>
+                  <a:xfrm flipH="1">
+                    <a:off x="3587231" y="2464264"/>
+                    <a:ext cx="625476" cy="588964"/>
                   </a:xfrm>
-                </p:grpSpPr>
-                <p:cxnSp>
-                  <p:nvCxnSpPr>
-                    <p:cNvPr id="110" name="Straight Connector 109">
-                      <a:extLst>
-                        <a:ext uri="{FF2B5EF4-FFF2-40B4-BE49-F238E27FC236}">
-                          <a16:creationId xmlns:a16="http://schemas.microsoft.com/office/drawing/2014/main" id="{1532717E-204C-46AF-B7F2-17ADBAD2F823}"/>
-                        </a:ext>
-                      </a:extLst>
-                    </p:cNvPr>
-                    <p:cNvCxnSpPr>
-                      <a:cxnSpLocks/>
-                    </p:cNvCxnSpPr>
-                    <p:nvPr/>
-                  </p:nvCxnSpPr>
-                  <p:spPr>
-                    <a:xfrm flipH="1">
-                      <a:off x="3587231" y="2464264"/>
-                      <a:ext cx="625476" cy="588964"/>
-                    </a:xfrm>
-                    <a:prstGeom prst="line">
-                      <a:avLst/>
-                    </a:prstGeom>
-                    <a:ln w="152400">
-                      <a:solidFill>
-                        <a:schemeClr val="tx1"/>
-                      </a:solidFill>
-                    </a:ln>
-                  </p:spPr>
-                  <p:style>
-                    <a:lnRef idx="1">
-                      <a:schemeClr val="accent1"/>
-                    </a:lnRef>
-                    <a:fillRef idx="0">
-                      <a:schemeClr val="accent1"/>
-                    </a:fillRef>
-                    <a:effectRef idx="0">
-                      <a:schemeClr val="accent1"/>
-                    </a:effectRef>
-                    <a:fontRef idx="minor">
+                  <a:prstGeom prst="line">
+                    <a:avLst/>
+                  </a:prstGeom>
+                  <a:ln w="152400">
+                    <a:solidFill>
                       <a:schemeClr val="tx1"/>
-                    </a:fontRef>
-                  </p:style>
-                </p:cxnSp>
-                <p:cxnSp>
-                  <p:nvCxnSpPr>
-                    <p:cNvPr id="111" name="Straight Connector 110">
-                      <a:extLst>
-                        <a:ext uri="{FF2B5EF4-FFF2-40B4-BE49-F238E27FC236}">
-                          <a16:creationId xmlns:a16="http://schemas.microsoft.com/office/drawing/2014/main" id="{44E84DE5-BFFB-4793-B474-3A381F5F29A4}"/>
-                        </a:ext>
-                      </a:extLst>
-                    </p:cNvPr>
-                    <p:cNvCxnSpPr>
-                      <a:cxnSpLocks/>
-                    </p:cNvCxnSpPr>
-                    <p:nvPr/>
-                  </p:nvCxnSpPr>
-                  <p:spPr>
-                    <a:xfrm>
-                      <a:off x="4099145" y="2464264"/>
-                      <a:ext cx="626400" cy="590400"/>
-                    </a:xfrm>
-                    <a:prstGeom prst="line">
-                      <a:avLst/>
-                    </a:prstGeom>
-                    <a:ln w="152400">
-                      <a:solidFill>
-                        <a:schemeClr val="tx1"/>
-                      </a:solidFill>
-                    </a:ln>
-                  </p:spPr>
-                  <p:style>
-                    <a:lnRef idx="1">
-                      <a:schemeClr val="accent1"/>
-                    </a:lnRef>
-                    <a:fillRef idx="0">
-                      <a:schemeClr val="accent1"/>
-                    </a:fillRef>
-                    <a:effectRef idx="0">
-                      <a:schemeClr val="accent1"/>
-                    </a:effectRef>
-                    <a:fontRef idx="minor">
-                      <a:schemeClr val="tx1"/>
-                    </a:fontRef>
-                  </p:style>
-                </p:cxnSp>
-              </p:grpSp>
-              <p:pic>
-                <p:nvPicPr>
-                  <p:cNvPr id="109" name="Graphic 108" descr="Home with solid fill">
+                    </a:solidFill>
+                  </a:ln>
+                </p:spPr>
+                <p:style>
+                  <a:lnRef idx="1">
+                    <a:schemeClr val="accent1"/>
+                  </a:lnRef>
+                  <a:fillRef idx="0">
+                    <a:schemeClr val="accent1"/>
+                  </a:fillRef>
+                  <a:effectRef idx="0">
+                    <a:schemeClr val="accent1"/>
+                  </a:effectRef>
+                  <a:fontRef idx="minor">
+                    <a:schemeClr val="tx1"/>
+                  </a:fontRef>
+                </p:style>
+              </p:cxnSp>
+              <p:cxnSp>
+                <p:nvCxnSpPr>
+                  <p:cNvPr id="111" name="Straight Connector 110">
                     <a:extLst>
                       <a:ext uri="{FF2B5EF4-FFF2-40B4-BE49-F238E27FC236}">
-                        <a16:creationId xmlns:a16="http://schemas.microsoft.com/office/drawing/2014/main" id="{F3A1B833-50A3-498E-90E3-4EF7C6FBE328}"/>
+                        <a16:creationId xmlns:a16="http://schemas.microsoft.com/office/drawing/2014/main" id="{44E84DE5-BFFB-4793-B474-3A381F5F29A4}"/>
                       </a:ext>
                     </a:extLst>
                   </p:cNvPr>
-                  <p:cNvPicPr>
-                    <a:picLocks noChangeAspect="1"/>
-                  </p:cNvPicPr>
+                  <p:cNvCxnSpPr>
+                    <a:cxnSpLocks/>
+                  </p:cNvCxnSpPr>
                   <p:nvPr/>
-                </p:nvPicPr>
-                <p:blipFill rotWithShape="1">
-                  <a:blip r:embed="rId2">
-                    <a:extLst>
-                      <a:ext uri="{28A0092B-C50C-407E-A947-70E740481C1C}">
-                        <a14:useLocalDpi xmlns:a14="http://schemas.microsoft.com/office/drawing/2010/main" val="0"/>
-                      </a:ext>
-                      <a:ext uri="{96DAC541-7B7A-43D3-8B79-37D633B846F1}">
-                        <asvg:svgBlip xmlns:asvg="http://schemas.microsoft.com/office/drawing/2016/SVG/main" r:embed="rId3"/>
-                      </a:ext>
-                    </a:extLst>
-                  </a:blip>
-                  <a:srcRect l="16712" t="27585" r="16736" b="1"/>
-                  <a:stretch/>
-                </p:blipFill>
+                </p:nvCxnSpPr>
                 <p:spPr>
                   <a:xfrm>
-                    <a:off x="3357014" y="2793377"/>
-                    <a:ext cx="1470660" cy="1600200"/>
+                    <a:off x="4099145" y="2464264"/>
+                    <a:ext cx="626400" cy="590400"/>
                   </a:xfrm>
-                  <a:prstGeom prst="snip2SameRect">
-                    <a:avLst>
-                      <a:gd name="adj1" fmla="val 41278"/>
-                      <a:gd name="adj2" fmla="val 0"/>
-                    </a:avLst>
+                  <a:prstGeom prst="line">
+                    <a:avLst/>
                   </a:prstGeom>
+                  <a:ln w="152400">
+                    <a:solidFill>
+                      <a:schemeClr val="tx1"/>
+                    </a:solidFill>
+                  </a:ln>
                 </p:spPr>
-              </p:pic>
+                <p:style>
+                  <a:lnRef idx="1">
+                    <a:schemeClr val="accent1"/>
+                  </a:lnRef>
+                  <a:fillRef idx="0">
+                    <a:schemeClr val="accent1"/>
+                  </a:fillRef>
+                  <a:effectRef idx="0">
+                    <a:schemeClr val="accent1"/>
+                  </a:effectRef>
+                  <a:fontRef idx="minor">
+                    <a:schemeClr val="tx1"/>
+                  </a:fontRef>
+                </p:style>
+              </p:cxnSp>
             </p:grpSp>
+            <p:pic>
+              <p:nvPicPr>
+                <p:cNvPr id="109" name="Graphic 108" descr="Home with solid fill">
+                  <a:extLst>
+                    <a:ext uri="{FF2B5EF4-FFF2-40B4-BE49-F238E27FC236}">
+                      <a16:creationId xmlns:a16="http://schemas.microsoft.com/office/drawing/2014/main" id="{F3A1B833-50A3-498E-90E3-4EF7C6FBE328}"/>
+                    </a:ext>
+                  </a:extLst>
+                </p:cNvPr>
+                <p:cNvPicPr>
+                  <a:picLocks noChangeAspect="1"/>
+                </p:cNvPicPr>
+                <p:nvPr/>
+              </p:nvPicPr>
+              <p:blipFill rotWithShape="1">
+                <a:blip r:embed="rId2">
+                  <a:extLst>
+                    <a:ext uri="{28A0092B-C50C-407E-A947-70E740481C1C}">
+                      <a14:useLocalDpi xmlns:a14="http://schemas.microsoft.com/office/drawing/2010/main" val="0"/>
+                    </a:ext>
+                    <a:ext uri="{96DAC541-7B7A-43D3-8B79-37D633B846F1}">
+                      <asvg:svgBlip xmlns:asvg="http://schemas.microsoft.com/office/drawing/2016/SVG/main" r:embed="rId3"/>
+                    </a:ext>
+                  </a:extLst>
+                </a:blip>
+                <a:srcRect l="16712" t="27585" r="16736" b="1"/>
+                <a:stretch/>
+              </p:blipFill>
+              <p:spPr>
+                <a:xfrm>
+                  <a:off x="3357014" y="2793377"/>
+                  <a:ext cx="1470660" cy="1600200"/>
+                </a:xfrm>
+                <a:prstGeom prst="snip2SameRect">
+                  <a:avLst>
+                    <a:gd name="adj1" fmla="val 41278"/>
+                    <a:gd name="adj2" fmla="val 0"/>
+                  </a:avLst>
+                </a:prstGeom>
+              </p:spPr>
+            </p:pic>
+          </p:grpSp>
+          <p:grpSp>
+            <p:nvGrpSpPr>
+              <p:cNvPr id="103" name="Group 102">
+                <a:extLst>
+                  <a:ext uri="{FF2B5EF4-FFF2-40B4-BE49-F238E27FC236}">
+                    <a16:creationId xmlns:a16="http://schemas.microsoft.com/office/drawing/2014/main" id="{AAD8E7A8-32D2-453B-9E34-0864BB6069DF}"/>
+                  </a:ext>
+                </a:extLst>
+              </p:cNvPr>
+              <p:cNvGrpSpPr/>
+              <p:nvPr/>
+            </p:nvGrpSpPr>
+            <p:grpSpPr>
+              <a:xfrm flipH="1">
+                <a:off x="5434958" y="2484436"/>
+                <a:ext cx="1604252" cy="1909141"/>
+                <a:chOff x="3223422" y="2484436"/>
+                <a:chExt cx="1604252" cy="1909141"/>
+              </a:xfrm>
+            </p:grpSpPr>
             <p:grpSp>
               <p:nvGrpSpPr>
-                <p:cNvPr id="103" name="Group 102">
+                <p:cNvPr id="104" name="Group 103">
                   <a:extLst>
                     <a:ext uri="{FF2B5EF4-FFF2-40B4-BE49-F238E27FC236}">
-                      <a16:creationId xmlns:a16="http://schemas.microsoft.com/office/drawing/2014/main" id="{AAD8E7A8-32D2-453B-9E34-0864BB6069DF}"/>
+                      <a16:creationId xmlns:a16="http://schemas.microsoft.com/office/drawing/2014/main" id="{1D4EF7A2-53B9-435E-B17E-2E1242B4D9E2}"/>
                     </a:ext>
                   </a:extLst>
                 </p:cNvPr>
@@ -7842,199 +7842,143 @@
                 <p:nvPr/>
               </p:nvGrpSpPr>
               <p:grpSpPr>
-                <a:xfrm flipH="1">
-                  <a:off x="5434958" y="2484436"/>
-                  <a:ext cx="1604252" cy="1909141"/>
-                  <a:chOff x="3223422" y="2484436"/>
-                  <a:chExt cx="1604252" cy="1909141"/>
+                <a:xfrm>
+                  <a:off x="3223422" y="2484436"/>
+                  <a:ext cx="1437699" cy="880118"/>
+                  <a:chOff x="3286922" y="2464264"/>
+                  <a:chExt cx="1437699" cy="880118"/>
                 </a:xfrm>
               </p:grpSpPr>
-              <p:grpSp>
-                <p:nvGrpSpPr>
-                  <p:cNvPr id="104" name="Group 103">
+              <p:cxnSp>
+                <p:nvCxnSpPr>
+                  <p:cNvPr id="106" name="Straight Connector 105">
                     <a:extLst>
                       <a:ext uri="{FF2B5EF4-FFF2-40B4-BE49-F238E27FC236}">
-                        <a16:creationId xmlns:a16="http://schemas.microsoft.com/office/drawing/2014/main" id="{1D4EF7A2-53B9-435E-B17E-2E1242B4D9E2}"/>
+                        <a16:creationId xmlns:a16="http://schemas.microsoft.com/office/drawing/2014/main" id="{B4DF94F7-35A3-4AB4-AD8B-3A6AD46AAA01}"/>
                       </a:ext>
                     </a:extLst>
                   </p:cNvPr>
-                  <p:cNvGrpSpPr/>
+                  <p:cNvCxnSpPr>
+                    <a:cxnSpLocks/>
+                  </p:cNvCxnSpPr>
                   <p:nvPr/>
-                </p:nvGrpSpPr>
-                <p:grpSpPr>
-                  <a:xfrm>
-                    <a:off x="3223422" y="2484436"/>
-                    <a:ext cx="1437699" cy="880118"/>
-                    <a:chOff x="3286922" y="2464264"/>
-                    <a:chExt cx="1437699" cy="880118"/>
+                </p:nvCxnSpPr>
+                <p:spPr>
+                  <a:xfrm flipH="1">
+                    <a:off x="3286922" y="2464264"/>
+                    <a:ext cx="925785" cy="880118"/>
                   </a:xfrm>
-                </p:grpSpPr>
-                <p:cxnSp>
-                  <p:nvCxnSpPr>
-                    <p:cNvPr id="106" name="Straight Connector 105">
-                      <a:extLst>
-                        <a:ext uri="{FF2B5EF4-FFF2-40B4-BE49-F238E27FC236}">
-                          <a16:creationId xmlns:a16="http://schemas.microsoft.com/office/drawing/2014/main" id="{B4DF94F7-35A3-4AB4-AD8B-3A6AD46AAA01}"/>
-                        </a:ext>
-                      </a:extLst>
-                    </p:cNvPr>
-                    <p:cNvCxnSpPr>
-                      <a:cxnSpLocks/>
-                    </p:cNvCxnSpPr>
-                    <p:nvPr/>
-                  </p:nvCxnSpPr>
-                  <p:spPr>
-                    <a:xfrm flipH="1">
-                      <a:off x="3286922" y="2464264"/>
-                      <a:ext cx="925785" cy="880118"/>
-                    </a:xfrm>
-                    <a:prstGeom prst="line">
-                      <a:avLst/>
-                    </a:prstGeom>
-                    <a:ln w="152400">
-                      <a:solidFill>
-                        <a:schemeClr val="tx1"/>
-                      </a:solidFill>
-                    </a:ln>
-                  </p:spPr>
-                  <p:style>
-                    <a:lnRef idx="1">
-                      <a:schemeClr val="accent1"/>
-                    </a:lnRef>
-                    <a:fillRef idx="0">
-                      <a:schemeClr val="accent1"/>
-                    </a:fillRef>
-                    <a:effectRef idx="0">
-                      <a:schemeClr val="accent1"/>
-                    </a:effectRef>
-                    <a:fontRef idx="minor">
+                  <a:prstGeom prst="line">
+                    <a:avLst/>
+                  </a:prstGeom>
+                  <a:ln w="152400">
+                    <a:solidFill>
                       <a:schemeClr val="tx1"/>
-                    </a:fontRef>
-                  </p:style>
-                </p:cxnSp>
-                <p:cxnSp>
-                  <p:nvCxnSpPr>
-                    <p:cNvPr id="107" name="Straight Connector 106">
-                      <a:extLst>
-                        <a:ext uri="{FF2B5EF4-FFF2-40B4-BE49-F238E27FC236}">
-                          <a16:creationId xmlns:a16="http://schemas.microsoft.com/office/drawing/2014/main" id="{BD1126EE-AD07-43B5-B568-E77FF2D6C322}"/>
-                        </a:ext>
-                      </a:extLst>
-                    </p:cNvPr>
-                    <p:cNvCxnSpPr>
-                      <a:cxnSpLocks/>
-                    </p:cNvCxnSpPr>
-                    <p:nvPr/>
-                  </p:nvCxnSpPr>
-                  <p:spPr>
-                    <a:xfrm>
-                      <a:off x="4099145" y="2464264"/>
-                      <a:ext cx="625476" cy="588964"/>
-                    </a:xfrm>
-                    <a:prstGeom prst="line">
-                      <a:avLst/>
-                    </a:prstGeom>
-                    <a:ln w="152400">
-                      <a:solidFill>
-                        <a:schemeClr val="tx1"/>
-                      </a:solidFill>
-                    </a:ln>
-                  </p:spPr>
-                  <p:style>
-                    <a:lnRef idx="1">
-                      <a:schemeClr val="accent1"/>
-                    </a:lnRef>
-                    <a:fillRef idx="0">
-                      <a:schemeClr val="accent1"/>
-                    </a:fillRef>
-                    <a:effectRef idx="0">
-                      <a:schemeClr val="accent1"/>
-                    </a:effectRef>
-                    <a:fontRef idx="minor">
-                      <a:schemeClr val="tx1"/>
-                    </a:fontRef>
-                  </p:style>
-                </p:cxnSp>
-              </p:grpSp>
-              <p:pic>
-                <p:nvPicPr>
-                  <p:cNvPr id="105" name="Graphic 104" descr="Home with solid fill">
+                    </a:solidFill>
+                  </a:ln>
+                </p:spPr>
+                <p:style>
+                  <a:lnRef idx="1">
+                    <a:schemeClr val="accent1"/>
+                  </a:lnRef>
+                  <a:fillRef idx="0">
+                    <a:schemeClr val="accent1"/>
+                  </a:fillRef>
+                  <a:effectRef idx="0">
+                    <a:schemeClr val="accent1"/>
+                  </a:effectRef>
+                  <a:fontRef idx="minor">
+                    <a:schemeClr val="tx1"/>
+                  </a:fontRef>
+                </p:style>
+              </p:cxnSp>
+              <p:cxnSp>
+                <p:nvCxnSpPr>
+                  <p:cNvPr id="107" name="Straight Connector 106">
                     <a:extLst>
                       <a:ext uri="{FF2B5EF4-FFF2-40B4-BE49-F238E27FC236}">
-                        <a16:creationId xmlns:a16="http://schemas.microsoft.com/office/drawing/2014/main" id="{3C266EA5-DD82-425C-8022-1E4001FD9A3F}"/>
+                        <a16:creationId xmlns:a16="http://schemas.microsoft.com/office/drawing/2014/main" id="{BD1126EE-AD07-43B5-B568-E77FF2D6C322}"/>
                       </a:ext>
                     </a:extLst>
                   </p:cNvPr>
-                  <p:cNvPicPr>
-                    <a:picLocks noChangeAspect="1"/>
-                  </p:cNvPicPr>
+                  <p:cNvCxnSpPr>
+                    <a:cxnSpLocks/>
+                  </p:cNvCxnSpPr>
                   <p:nvPr/>
-                </p:nvPicPr>
-                <p:blipFill rotWithShape="1">
-                  <a:blip r:embed="rId2">
-                    <a:extLst>
-                      <a:ext uri="{28A0092B-C50C-407E-A947-70E740481C1C}">
-                        <a14:useLocalDpi xmlns:a14="http://schemas.microsoft.com/office/drawing/2010/main" val="0"/>
-                      </a:ext>
-                      <a:ext uri="{96DAC541-7B7A-43D3-8B79-37D633B846F1}">
-                        <asvg:svgBlip xmlns:asvg="http://schemas.microsoft.com/office/drawing/2016/SVG/main" r:embed="rId3"/>
-                      </a:ext>
-                    </a:extLst>
-                  </a:blip>
-                  <a:srcRect l="16712" t="27585" r="16736" b="1"/>
-                  <a:stretch/>
-                </p:blipFill>
+                </p:nvCxnSpPr>
                 <p:spPr>
                   <a:xfrm>
-                    <a:off x="3357014" y="2793377"/>
-                    <a:ext cx="1470660" cy="1600200"/>
+                    <a:off x="4099145" y="2464264"/>
+                    <a:ext cx="625476" cy="588964"/>
                   </a:xfrm>
-                  <a:prstGeom prst="snip2SameRect">
-                    <a:avLst>
-                      <a:gd name="adj1" fmla="val 41278"/>
-                      <a:gd name="adj2" fmla="val 0"/>
-                    </a:avLst>
+                  <a:prstGeom prst="line">
+                    <a:avLst/>
                   </a:prstGeom>
+                  <a:ln w="152400">
+                    <a:solidFill>
+                      <a:schemeClr val="tx1"/>
+                    </a:solidFill>
+                  </a:ln>
                 </p:spPr>
-              </p:pic>
+                <p:style>
+                  <a:lnRef idx="1">
+                    <a:schemeClr val="accent1"/>
+                  </a:lnRef>
+                  <a:fillRef idx="0">
+                    <a:schemeClr val="accent1"/>
+                  </a:fillRef>
+                  <a:effectRef idx="0">
+                    <a:schemeClr val="accent1"/>
+                  </a:effectRef>
+                  <a:fontRef idx="minor">
+                    <a:schemeClr val="tx1"/>
+                  </a:fontRef>
+                </p:style>
+              </p:cxnSp>
             </p:grpSp>
+            <p:pic>
+              <p:nvPicPr>
+                <p:cNvPr id="105" name="Graphic 104" descr="Home with solid fill">
+                  <a:extLst>
+                    <a:ext uri="{FF2B5EF4-FFF2-40B4-BE49-F238E27FC236}">
+                      <a16:creationId xmlns:a16="http://schemas.microsoft.com/office/drawing/2014/main" id="{3C266EA5-DD82-425C-8022-1E4001FD9A3F}"/>
+                    </a:ext>
+                  </a:extLst>
+                </p:cNvPr>
+                <p:cNvPicPr>
+                  <a:picLocks noChangeAspect="1"/>
+                </p:cNvPicPr>
+                <p:nvPr/>
+              </p:nvPicPr>
+              <p:blipFill rotWithShape="1">
+                <a:blip r:embed="rId2">
+                  <a:extLst>
+                    <a:ext uri="{28A0092B-C50C-407E-A947-70E740481C1C}">
+                      <a14:useLocalDpi xmlns:a14="http://schemas.microsoft.com/office/drawing/2010/main" val="0"/>
+                    </a:ext>
+                    <a:ext uri="{96DAC541-7B7A-43D3-8B79-37D633B846F1}">
+                      <asvg:svgBlip xmlns:asvg="http://schemas.microsoft.com/office/drawing/2016/SVG/main" r:embed="rId3"/>
+                    </a:ext>
+                  </a:extLst>
+                </a:blip>
+                <a:srcRect l="16712" t="27585" r="16736" b="1"/>
+                <a:stretch/>
+              </p:blipFill>
+              <p:spPr>
+                <a:xfrm>
+                  <a:off x="3357014" y="2793377"/>
+                  <a:ext cx="1470660" cy="1600200"/>
+                </a:xfrm>
+                <a:prstGeom prst="snip2SameRect">
+                  <a:avLst>
+                    <a:gd name="adj1" fmla="val 41278"/>
+                    <a:gd name="adj2" fmla="val 0"/>
+                  </a:avLst>
+                </a:prstGeom>
+              </p:spPr>
+            </p:pic>
           </p:grpSp>
         </p:grpSp>
-        <p:pic>
-          <p:nvPicPr>
-            <p:cNvPr id="5" name="Picture 4" descr="Icon&#10;&#10;Description automatically generated">
-              <a:extLst>
-                <a:ext uri="{FF2B5EF4-FFF2-40B4-BE49-F238E27FC236}">
-                  <a16:creationId xmlns:a16="http://schemas.microsoft.com/office/drawing/2014/main" id="{CE9AC9D6-FCC5-4A43-967D-BDE4FEB9DC34}"/>
-                </a:ext>
-              </a:extLst>
-            </p:cNvPr>
-            <p:cNvPicPr>
-              <a:picLocks noChangeAspect="1"/>
-            </p:cNvPicPr>
-            <p:nvPr/>
-          </p:nvPicPr>
-          <p:blipFill rotWithShape="1">
-            <a:blip r:embed="rId4">
-              <a:extLst>
-                <a:ext uri="{28A0092B-C50C-407E-A947-70E740481C1C}">
-                  <a14:useLocalDpi xmlns:a14="http://schemas.microsoft.com/office/drawing/2010/main" val="0"/>
-                </a:ext>
-              </a:extLst>
-            </a:blip>
-            <a:srcRect l="21022" t="18042" r="10285" b="31347"/>
-            <a:stretch/>
-          </p:blipFill>
-          <p:spPr>
-            <a:xfrm>
-              <a:off x="10694171" y="2450170"/>
-              <a:ext cx="771522" cy="791084"/>
-            </a:xfrm>
-            <a:prstGeom prst="rect">
-              <a:avLst/>
-            </a:prstGeom>
-          </p:spPr>
-        </p:pic>
       </p:grpSp>
     </p:spTree>
     <p:extLst>

</xml_diff>